<commit_message>
PPT and Video File
</commit_message>
<xml_diff>
--- a/source/Documentation(New Spatial Learning Experiment-2023-2024)/Implement the new Spatial Learning Experiment_TheLazyCoders.pptx
+++ b/source/Documentation(New Spatial Learning Experiment-2023-2024)/Implement the new Spatial Learning Experiment_TheLazyCoders.pptx
@@ -209,7 +209,7 @@
           <a:p>
             <a:fld id="{1DDBB8A4-3176-4BD7-B306-7CA2D79B1C24}" type="datetimeFigureOut">
               <a:rPr lang="en-US" smtClean="0"/>
-              <a:t>3/31/2024</a:t>
+              <a:t>4/7/2024</a:t>
             </a:fld>
             <a:endParaRPr lang="en-US"/>
           </a:p>
@@ -1198,7 +1198,7 @@
           <a:p>
             <a:fld id="{2A58828F-776C-4645-9F27-91AAF3A3F302}" type="datetime1">
               <a:rPr lang="en-US" smtClean="0"/>
-              <a:t>3/31/2024</a:t>
+              <a:t>4/7/2024</a:t>
             </a:fld>
             <a:endParaRPr lang="en-US"/>
           </a:p>
@@ -1452,7 +1452,7 @@
           <a:p>
             <a:fld id="{B04EA24A-FE67-4760-927F-D5EDDCF0AC20}" type="datetime1">
               <a:rPr lang="en-US" smtClean="0"/>
-              <a:t>3/31/2024</a:t>
+              <a:t>4/7/2024</a:t>
             </a:fld>
             <a:endParaRPr lang="en-US"/>
           </a:p>
@@ -1770,7 +1770,7 @@
           <a:p>
             <a:fld id="{B04EA24A-FE67-4760-927F-D5EDDCF0AC20}" type="datetime1">
               <a:rPr lang="en-US" smtClean="0"/>
-              <a:t>3/31/2024</a:t>
+              <a:t>4/7/2024</a:t>
             </a:fld>
             <a:endParaRPr lang="en-US"/>
           </a:p>
@@ -2115,7 +2115,7 @@
           <a:p>
             <a:fld id="{B04EA24A-FE67-4760-927F-D5EDDCF0AC20}" type="datetime1">
               <a:rPr lang="en-US" smtClean="0"/>
-              <a:t>3/31/2024</a:t>
+              <a:t>4/7/2024</a:t>
             </a:fld>
             <a:endParaRPr lang="en-US"/>
           </a:p>
@@ -2433,7 +2433,7 @@
           <a:p>
             <a:fld id="{B04EA24A-FE67-4760-927F-D5EDDCF0AC20}" type="datetime1">
               <a:rPr lang="en-US" smtClean="0"/>
-              <a:t>3/31/2024</a:t>
+              <a:t>4/7/2024</a:t>
             </a:fld>
             <a:endParaRPr lang="en-US"/>
           </a:p>
@@ -2830,7 +2830,7 @@
           <a:p>
             <a:fld id="{B04EA24A-FE67-4760-927F-D5EDDCF0AC20}" type="datetime1">
               <a:rPr lang="en-US" smtClean="0"/>
-              <a:t>3/31/2024</a:t>
+              <a:t>4/7/2024</a:t>
             </a:fld>
             <a:endParaRPr lang="en-US"/>
           </a:p>
@@ -3004,7 +3004,7 @@
           <a:p>
             <a:fld id="{C9A344B0-8E01-477C-8504-FC70DA424A6E}" type="datetime1">
               <a:rPr lang="en-US" smtClean="0"/>
-              <a:t>3/31/2024</a:t>
+              <a:t>4/7/2024</a:t>
             </a:fld>
             <a:endParaRPr lang="en-US"/>
           </a:p>
@@ -3187,7 +3187,7 @@
           <a:p>
             <a:fld id="{1EF6CB7C-8FB2-4E3D-B589-FA9A8C53C3EF}" type="datetime1">
               <a:rPr lang="en-US" smtClean="0"/>
-              <a:t>3/31/2024</a:t>
+              <a:t>4/7/2024</a:t>
             </a:fld>
             <a:endParaRPr lang="en-US"/>
           </a:p>
@@ -3366,7 +3366,7 @@
           <a:p>
             <a:fld id="{5C65C097-189D-44BE-B821-9AA779BDDDDE}" type="datetime1">
               <a:rPr lang="en-US" smtClean="0"/>
-              <a:t>3/31/2024</a:t>
+              <a:t>4/7/2024</a:t>
             </a:fld>
             <a:endParaRPr lang="en-US"/>
           </a:p>
@@ -3616,7 +3616,7 @@
           <a:p>
             <a:fld id="{499F535E-1ACD-4F65-AE51-4105C09FC250}" type="datetime1">
               <a:rPr lang="en-US" smtClean="0"/>
-              <a:t>3/31/2024</a:t>
+              <a:t>4/7/2024</a:t>
             </a:fld>
             <a:endParaRPr lang="en-US"/>
           </a:p>
@@ -3851,7 +3851,7 @@
           <a:p>
             <a:fld id="{816863FE-10A3-409A-BFFD-53D372617ED4}" type="datetime1">
               <a:rPr lang="en-US" smtClean="0"/>
-              <a:t>3/31/2024</a:t>
+              <a:t>4/7/2024</a:t>
             </a:fld>
             <a:endParaRPr lang="en-US"/>
           </a:p>
@@ -4228,7 +4228,7 @@
           <a:p>
             <a:fld id="{BF223D3E-E14F-46B0-B0F9-48659A9074E7}" type="datetime1">
               <a:rPr lang="en-US" smtClean="0"/>
-              <a:t>3/31/2024</a:t>
+              <a:t>4/7/2024</a:t>
             </a:fld>
             <a:endParaRPr lang="en-US"/>
           </a:p>
@@ -4354,7 +4354,7 @@
           <a:p>
             <a:fld id="{8CD40B86-76D2-42E2-8C79-71DFA1C05AE2}" type="datetime1">
               <a:rPr lang="en-US" smtClean="0"/>
-              <a:t>3/31/2024</a:t>
+              <a:t>4/7/2024</a:t>
             </a:fld>
             <a:endParaRPr lang="en-US"/>
           </a:p>
@@ -4452,7 +4452,7 @@
           <a:p>
             <a:fld id="{C3EF1045-EA33-4E9B-BE97-BC71BA903913}" type="datetime1">
               <a:rPr lang="en-US" smtClean="0"/>
-              <a:t>3/31/2024</a:t>
+              <a:t>4/7/2024</a:t>
             </a:fld>
             <a:endParaRPr lang="en-US"/>
           </a:p>
@@ -4710,7 +4710,7 @@
           <a:p>
             <a:fld id="{A718B98C-2565-4C61-98C9-508D7F589433}" type="datetime1">
               <a:rPr lang="en-US" smtClean="0"/>
-              <a:t>3/31/2024</a:t>
+              <a:t>4/7/2024</a:t>
             </a:fld>
             <a:endParaRPr lang="en-US"/>
           </a:p>
@@ -4976,7 +4976,7 @@
           <a:p>
             <a:fld id="{4AA1A726-4AC1-4047-9E6B-F7D64EFBF321}" type="datetime1">
               <a:rPr lang="en-US" smtClean="0"/>
-              <a:t>3/31/2024</a:t>
+              <a:t>4/7/2024</a:t>
             </a:fld>
             <a:endParaRPr lang="en-US"/>
           </a:p>
@@ -5722,7 +5722,7 @@
           <a:p>
             <a:fld id="{B04EA24A-FE67-4760-927F-D5EDDCF0AC20}" type="datetime1">
               <a:rPr lang="en-US" smtClean="0"/>
-              <a:t>3/31/2024</a:t>
+              <a:t>4/7/2024</a:t>
             </a:fld>
             <a:endParaRPr lang="en-US"/>
           </a:p>
@@ -6286,7 +6286,7 @@
                 <a:latin typeface="Times New Roman" panose="02020603050405020304" pitchFamily="18" charset="0"/>
                 <a:cs typeface="Times New Roman" panose="02020603050405020304" pitchFamily="18" charset="0"/>
               </a:rPr>
-              <a:t>SE 23/24 Implement the New Spatial Learning Experiment</a:t>
+              <a:t>ML 23/24–03 Implement the New Spatial Learning Experiment</a:t>
             </a:r>
           </a:p>
         </p:txBody>
@@ -6400,7 +6400,7 @@
                 <a:latin typeface="Times New Roman" panose="02020603050405020304" pitchFamily="18" charset="0"/>
                 <a:cs typeface="Times New Roman" panose="02020603050405020304" pitchFamily="18" charset="0"/>
               </a:rPr>
-              <a:t>Mandar Kale (1501517)</a:t>
+              <a:t>Mandar Gokul Kale (1501517)</a:t>
             </a:r>
           </a:p>
           <a:p>
@@ -6686,7 +6686,10 @@
           <a:lstStyle/>
           <a:p>
             <a:r>
-              <a:rPr lang="en-US" sz="1000" dirty="0"/>
+              <a:rPr lang="en-US" sz="1000" dirty="0">
+                <a:latin typeface="Times New Roman" panose="02020603050405020304" pitchFamily="18" charset="0"/>
+                <a:cs typeface="Times New Roman" panose="02020603050405020304" pitchFamily="18" charset="0"/>
+              </a:rPr>
               <a:t>Fig. 6: Unit Testing for Jaccard Similarity</a:t>
             </a:r>
           </a:p>
@@ -7051,7 +7054,7 @@
                 <a:latin typeface="Times New Roman" panose="02020603050405020304" pitchFamily="18" charset="0"/>
                 <a:cs typeface="Times New Roman" panose="02020603050405020304" pitchFamily="18" charset="0"/>
               </a:rPr>
-              <a:t>Fig.5 Output representation </a:t>
+              <a:t>Fig 7. Output representation </a:t>
             </a:r>
           </a:p>
         </p:txBody>
@@ -7565,7 +7568,7 @@
                 <a:ea typeface="SimSun" panose="02010600030101010101" pitchFamily="2" charset="-122"/>
                 <a:cs typeface="Times New Roman" panose="02020603050405020304" pitchFamily="18" charset="0"/>
               </a:rPr>
-              <a:t>The aim of this project is on optimizing the performance of the HTM (Hierarchical Temporal Memory) Spatial Pooler by fine-tuning key parameters with appropriate exit condition presenting output more effectively and addressing specific challenges encountered during the learning phase. </a:t>
+              <a:t>The aim of this project is optimizing the performance of the HTM (Hierarchical Temporal Memory) Spatial Pooler by fine-tuning key parameters with appropriate exit condition presenting output more effectively and addressing specific challenges encountered during the learning phase. </a:t>
             </a:r>
             <a:endParaRPr lang="en-US" dirty="0">
               <a:latin typeface="Times New Roman" panose="02020603050405020304" pitchFamily="18" charset="0"/>
@@ -8687,8 +8690,8 @@
           </a:p>
         </p:txBody>
       </p:sp>
-      <mc:AlternateContent xmlns:mc="http://schemas.openxmlformats.org/markup-compatibility/2006" xmlns:a14="http://schemas.microsoft.com/office/drawing/2010/main">
-        <mc:Choice Requires="a14">
+      <mc:AlternateContent xmlns:mc="http://schemas.openxmlformats.org/markup-compatibility/2006">
+        <mc:Choice xmlns:a14="http://schemas.microsoft.com/office/drawing/2010/main" Requires="a14">
           <p:sp>
             <p:nvSpPr>
               <p:cNvPr id="4" name="TextBox 3">
@@ -8709,6 +8712,9 @@
               <a:prstGeom prst="rect">
                 <a:avLst/>
               </a:prstGeom>
+              <a:ln>
+                <a:noFill/>
+              </a:ln>
             </p:spPr>
             <p:style>
               <a:lnRef idx="2">
@@ -8737,7 +8743,6 @@
                 </a:endParaRPr>
               </a:p>
               <a:p>
-                <a:pPr algn="ctr"/>
                 <a:r>
                   <a:rPr lang="en-US" dirty="0">
                     <a:latin typeface="Times New Roman" panose="02020603050405020304" pitchFamily="18" charset="0"/>
@@ -8762,7 +8767,6 @@
                 </a:r>
               </a:p>
               <a:p>
-                <a:pPr algn="ctr"/>
                 <a:endParaRPr lang="en-US" sz="1600" dirty="0">
                   <a:effectLst/>
                   <a:latin typeface="Times New Roman" panose="02020603050405020304" pitchFamily="18" charset="0"/>
@@ -8770,7 +8774,6 @@
                 </a:endParaRPr>
               </a:p>
               <a:p>
-                <a:pPr algn="ctr"/>
                 <a:r>
                   <a:rPr lang="en-US" sz="1600" dirty="0">
                     <a:latin typeface="Times New Roman" panose="02020603050405020304" pitchFamily="18" charset="0"/>
@@ -8792,7 +8795,7 @@
                 </a:endParaRPr>
               </a:p>
               <a:p>
-                <a:pPr marL="0" marR="0" algn="ctr">
+                <a:pPr marL="0" marR="0">
                   <a:spcBef>
                     <a:spcPts val="0"/>
                   </a:spcBef>
@@ -8875,7 +8878,7 @@
                 </a:r>
               </a:p>
               <a:p>
-                <a:pPr marL="0" marR="0" algn="ctr">
+                <a:pPr marL="0" marR="0">
                   <a:spcBef>
                     <a:spcPts val="0"/>
                   </a:spcBef>
@@ -9139,14 +9142,12 @@
                 </a:r>
               </a:p>
               <a:p>
-                <a:pPr algn="ctr"/>
                 <a:endParaRPr lang="en-US" sz="1600" dirty="0">
                   <a:latin typeface="Times New Roman" panose="02020603050405020304" pitchFamily="18" charset="0"/>
                   <a:ea typeface="Times New Roman" panose="02020603050405020304" pitchFamily="18" charset="0"/>
                 </a:endParaRPr>
               </a:p>
               <a:p>
-                <a:pPr algn="ctr"/>
                 <a:r>
                   <a:rPr lang="en-US" sz="1600" dirty="0">
                     <a:latin typeface="Times New Roman" panose="02020603050405020304" pitchFamily="18" charset="0"/>
@@ -9176,7 +9177,7 @@
             </p:txBody>
           </p:sp>
         </mc:Choice>
-        <mc:Fallback xmlns="">
+        <mc:Fallback>
           <p:sp>
             <p:nvSpPr>
               <p:cNvPr id="4" name="TextBox 3">
@@ -9202,9 +9203,12 @@
               <a:blipFill>
                 <a:blip r:embed="rId2"/>
                 <a:stretch>
-                  <a:fillRect/>
+                  <a:fillRect l="-791"/>
                 </a:stretch>
               </a:blipFill>
+              <a:ln>
+                <a:noFill/>
+              </a:ln>
             </p:spPr>
             <p:txBody>
               <a:bodyPr/>

</xml_diff>